<commit_message>
Update Game Design 10 -- Pitch Deck.pptx
</commit_message>
<xml_diff>
--- a/Documents/Game Design 10 -- Pitch Deck.pptx
+++ b/Documents/Game Design 10 -- Pitch Deck.pptx
@@ -6,6 +6,7 @@
   </p:sldMasterIdLst>
   <p:sldIdLst>
     <p:sldId id="256" r:id="rId2"/>
+    <p:sldId id="257" r:id="rId3"/>
   </p:sldIdLst>
   <p:sldSz cx="12192000" cy="6858000"/>
   <p:notesSz cx="6858000" cy="9144000"/>
@@ -104,6 +105,11 @@
       </a:defRPr>
     </a:lvl9pPr>
   </p:defaultTextStyle>
+  <p:extLst>
+    <p:ext uri="{EFAFB233-063F-42B5-8137-9DF3F51BA10A}">
+      <p15:sldGuideLst xmlns:p15="http://schemas.microsoft.com/office/powerpoint/2012/main"/>
+    </p:ext>
+  </p:extLst>
 </p:presentation>
 </file>
 
@@ -256,7 +262,7 @@
           <a:p>
             <a:fld id="{107BE4AD-393C-4DF3-955D-2121D5F9E5E1}" type="datetimeFigureOut">
               <a:rPr lang="en-AU" smtClean="0"/>
-              <a:t>13/06/2025</a:t>
+              <a:t>20/06/2025</a:t>
             </a:fld>
             <a:endParaRPr lang="en-AU"/>
           </a:p>
@@ -456,7 +462,7 @@
           <a:p>
             <a:fld id="{107BE4AD-393C-4DF3-955D-2121D5F9E5E1}" type="datetimeFigureOut">
               <a:rPr lang="en-AU" smtClean="0"/>
-              <a:t>13/06/2025</a:t>
+              <a:t>20/06/2025</a:t>
             </a:fld>
             <a:endParaRPr lang="en-AU"/>
           </a:p>
@@ -666,7 +672,7 @@
           <a:p>
             <a:fld id="{107BE4AD-393C-4DF3-955D-2121D5F9E5E1}" type="datetimeFigureOut">
               <a:rPr lang="en-AU" smtClean="0"/>
-              <a:t>13/06/2025</a:t>
+              <a:t>20/06/2025</a:t>
             </a:fld>
             <a:endParaRPr lang="en-AU"/>
           </a:p>
@@ -866,7 +872,7 @@
           <a:p>
             <a:fld id="{107BE4AD-393C-4DF3-955D-2121D5F9E5E1}" type="datetimeFigureOut">
               <a:rPr lang="en-AU" smtClean="0"/>
-              <a:t>13/06/2025</a:t>
+              <a:t>20/06/2025</a:t>
             </a:fld>
             <a:endParaRPr lang="en-AU"/>
           </a:p>
@@ -1142,7 +1148,7 @@
           <a:p>
             <a:fld id="{107BE4AD-393C-4DF3-955D-2121D5F9E5E1}" type="datetimeFigureOut">
               <a:rPr lang="en-AU" smtClean="0"/>
-              <a:t>13/06/2025</a:t>
+              <a:t>20/06/2025</a:t>
             </a:fld>
             <a:endParaRPr lang="en-AU"/>
           </a:p>
@@ -1410,7 +1416,7 @@
           <a:p>
             <a:fld id="{107BE4AD-393C-4DF3-955D-2121D5F9E5E1}" type="datetimeFigureOut">
               <a:rPr lang="en-AU" smtClean="0"/>
-              <a:t>13/06/2025</a:t>
+              <a:t>20/06/2025</a:t>
             </a:fld>
             <a:endParaRPr lang="en-AU"/>
           </a:p>
@@ -1825,7 +1831,7 @@
           <a:p>
             <a:fld id="{107BE4AD-393C-4DF3-955D-2121D5F9E5E1}" type="datetimeFigureOut">
               <a:rPr lang="en-AU" smtClean="0"/>
-              <a:t>13/06/2025</a:t>
+              <a:t>20/06/2025</a:t>
             </a:fld>
             <a:endParaRPr lang="en-AU"/>
           </a:p>
@@ -1967,7 +1973,7 @@
           <a:p>
             <a:fld id="{107BE4AD-393C-4DF3-955D-2121D5F9E5E1}" type="datetimeFigureOut">
               <a:rPr lang="en-AU" smtClean="0"/>
-              <a:t>13/06/2025</a:t>
+              <a:t>20/06/2025</a:t>
             </a:fld>
             <a:endParaRPr lang="en-AU"/>
           </a:p>
@@ -2080,7 +2086,7 @@
           <a:p>
             <a:fld id="{107BE4AD-393C-4DF3-955D-2121D5F9E5E1}" type="datetimeFigureOut">
               <a:rPr lang="en-AU" smtClean="0"/>
-              <a:t>13/06/2025</a:t>
+              <a:t>20/06/2025</a:t>
             </a:fld>
             <a:endParaRPr lang="en-AU"/>
           </a:p>
@@ -2393,7 +2399,7 @@
           <a:p>
             <a:fld id="{107BE4AD-393C-4DF3-955D-2121D5F9E5E1}" type="datetimeFigureOut">
               <a:rPr lang="en-AU" smtClean="0"/>
-              <a:t>13/06/2025</a:t>
+              <a:t>20/06/2025</a:t>
             </a:fld>
             <a:endParaRPr lang="en-AU"/>
           </a:p>
@@ -2682,7 +2688,7 @@
           <a:p>
             <a:fld id="{107BE4AD-393C-4DF3-955D-2121D5F9E5E1}" type="datetimeFigureOut">
               <a:rPr lang="en-AU" smtClean="0"/>
-              <a:t>13/06/2025</a:t>
+              <a:t>20/06/2025</a:t>
             </a:fld>
             <a:endParaRPr lang="en-AU"/>
           </a:p>
@@ -2925,7 +2931,7 @@
           <a:p>
             <a:fld id="{107BE4AD-393C-4DF3-955D-2121D5F9E5E1}" type="datetimeFigureOut">
               <a:rPr lang="en-AU" smtClean="0"/>
-              <a:t>13/06/2025</a:t>
+              <a:t>20/06/2025</a:t>
             </a:fld>
             <a:endParaRPr lang="en-AU"/>
           </a:p>
@@ -3360,10 +3366,15 @@
         </p:nvSpPr>
         <p:spPr/>
         <p:txBody>
-          <a:bodyPr/>
-          <a:lstStyle/>
-          <a:p>
-            <a:endParaRPr lang="en-AU"/>
+          <a:bodyPr>
+            <a:normAutofit/>
+          </a:bodyPr>
+          <a:lstStyle/>
+          <a:p>
+            <a:r>
+              <a:rPr lang="en-AU" dirty="0"/>
+              <a:t>Super Duper Bowling!!</a:t>
+            </a:r>
           </a:p>
         </p:txBody>
       </p:sp>
@@ -3396,6 +3407,86 @@
     <p:extLst>
       <p:ext uri="{BB962C8B-B14F-4D97-AF65-F5344CB8AC3E}">
         <p14:creationId xmlns:p14="http://schemas.microsoft.com/office/powerpoint/2010/main" val="2943942040"/>
+      </p:ext>
+    </p:extLst>
+  </p:cSld>
+  <p:clrMapOvr>
+    <a:masterClrMapping/>
+  </p:clrMapOvr>
+</p:sld>
+</file>
+
+<file path=ppt/slides/slide2.xml><?xml version="1.0" encoding="utf-8"?>
+<p:sld xmlns:a="http://schemas.openxmlformats.org/drawingml/2006/main" xmlns:r="http://schemas.openxmlformats.org/officeDocument/2006/relationships" xmlns:p="http://schemas.openxmlformats.org/presentationml/2006/main">
+  <p:cSld>
+    <p:spTree>
+      <p:nvGrpSpPr>
+        <p:cNvPr id="1" name=""/>
+        <p:cNvGrpSpPr/>
+        <p:nvPr/>
+      </p:nvGrpSpPr>
+      <p:grpSpPr>
+        <a:xfrm>
+          <a:off x="0" y="0"/>
+          <a:ext cx="0" cy="0"/>
+          <a:chOff x="0" y="0"/>
+          <a:chExt cx="0" cy="0"/>
+        </a:xfrm>
+      </p:grpSpPr>
+      <p:sp>
+        <p:nvSpPr>
+          <p:cNvPr id="2" name="Title 1">
+            <a:extLst>
+              <a:ext uri="{FF2B5EF4-FFF2-40B4-BE49-F238E27FC236}">
+                <a16:creationId xmlns:a16="http://schemas.microsoft.com/office/drawing/2014/main" id="{AC65469C-5EF4-A4E7-05B1-9307456735F5}"/>
+              </a:ext>
+            </a:extLst>
+          </p:cNvPr>
+          <p:cNvSpPr>
+            <a:spLocks noGrp="1"/>
+          </p:cNvSpPr>
+          <p:nvPr>
+            <p:ph type="title"/>
+          </p:nvPr>
+        </p:nvSpPr>
+        <p:spPr/>
+        <p:txBody>
+          <a:bodyPr/>
+          <a:lstStyle/>
+          <a:p>
+            <a:endParaRPr lang="en-AU" dirty="0"/>
+          </a:p>
+        </p:txBody>
+      </p:sp>
+      <p:sp>
+        <p:nvSpPr>
+          <p:cNvPr id="3" name="Content Placeholder 2">
+            <a:extLst>
+              <a:ext uri="{FF2B5EF4-FFF2-40B4-BE49-F238E27FC236}">
+                <a16:creationId xmlns:a16="http://schemas.microsoft.com/office/drawing/2014/main" id="{F216C3F3-2F1A-91D8-783D-A0561F79868A}"/>
+              </a:ext>
+            </a:extLst>
+          </p:cNvPr>
+          <p:cNvSpPr>
+            <a:spLocks noGrp="1"/>
+          </p:cNvSpPr>
+          <p:nvPr>
+            <p:ph idx="1"/>
+          </p:nvPr>
+        </p:nvSpPr>
+        <p:spPr/>
+        <p:txBody>
+          <a:bodyPr/>
+          <a:lstStyle/>
+          <a:p>
+            <a:endParaRPr lang="en-AU" dirty="0"/>
+          </a:p>
+        </p:txBody>
+      </p:sp>
+    </p:spTree>
+    <p:extLst>
+      <p:ext uri="{BB962C8B-B14F-4D97-AF65-F5344CB8AC3E}">
+        <p14:creationId xmlns:p14="http://schemas.microsoft.com/office/powerpoint/2010/main" val="3361504621"/>
       </p:ext>
     </p:extLst>
   </p:cSld>

</xml_diff>

<commit_message>
Pitch Deck + Quit Button
- Modified the Pitch Deck word doc
- Quit button now works inside the unity editor
</commit_message>
<xml_diff>
--- a/Documents/Game Design 10 -- Pitch Deck.pptx
+++ b/Documents/Game Design 10 -- Pitch Deck.pptx
@@ -262,7 +262,7 @@
           <a:p>
             <a:fld id="{107BE4AD-393C-4DF3-955D-2121D5F9E5E1}" type="datetimeFigureOut">
               <a:rPr lang="en-AU" smtClean="0"/>
-              <a:t>20/06/2025</a:t>
+              <a:t>27/06/2025</a:t>
             </a:fld>
             <a:endParaRPr lang="en-AU"/>
           </a:p>
@@ -462,7 +462,7 @@
           <a:p>
             <a:fld id="{107BE4AD-393C-4DF3-955D-2121D5F9E5E1}" type="datetimeFigureOut">
               <a:rPr lang="en-AU" smtClean="0"/>
-              <a:t>20/06/2025</a:t>
+              <a:t>27/06/2025</a:t>
             </a:fld>
             <a:endParaRPr lang="en-AU"/>
           </a:p>
@@ -672,7 +672,7 @@
           <a:p>
             <a:fld id="{107BE4AD-393C-4DF3-955D-2121D5F9E5E1}" type="datetimeFigureOut">
               <a:rPr lang="en-AU" smtClean="0"/>
-              <a:t>20/06/2025</a:t>
+              <a:t>27/06/2025</a:t>
             </a:fld>
             <a:endParaRPr lang="en-AU"/>
           </a:p>
@@ -872,7 +872,7 @@
           <a:p>
             <a:fld id="{107BE4AD-393C-4DF3-955D-2121D5F9E5E1}" type="datetimeFigureOut">
               <a:rPr lang="en-AU" smtClean="0"/>
-              <a:t>20/06/2025</a:t>
+              <a:t>27/06/2025</a:t>
             </a:fld>
             <a:endParaRPr lang="en-AU"/>
           </a:p>
@@ -1148,7 +1148,7 @@
           <a:p>
             <a:fld id="{107BE4AD-393C-4DF3-955D-2121D5F9E5E1}" type="datetimeFigureOut">
               <a:rPr lang="en-AU" smtClean="0"/>
-              <a:t>20/06/2025</a:t>
+              <a:t>27/06/2025</a:t>
             </a:fld>
             <a:endParaRPr lang="en-AU"/>
           </a:p>
@@ -1416,7 +1416,7 @@
           <a:p>
             <a:fld id="{107BE4AD-393C-4DF3-955D-2121D5F9E5E1}" type="datetimeFigureOut">
               <a:rPr lang="en-AU" smtClean="0"/>
-              <a:t>20/06/2025</a:t>
+              <a:t>27/06/2025</a:t>
             </a:fld>
             <a:endParaRPr lang="en-AU"/>
           </a:p>
@@ -1831,7 +1831,7 @@
           <a:p>
             <a:fld id="{107BE4AD-393C-4DF3-955D-2121D5F9E5E1}" type="datetimeFigureOut">
               <a:rPr lang="en-AU" smtClean="0"/>
-              <a:t>20/06/2025</a:t>
+              <a:t>27/06/2025</a:t>
             </a:fld>
             <a:endParaRPr lang="en-AU"/>
           </a:p>
@@ -1973,7 +1973,7 @@
           <a:p>
             <a:fld id="{107BE4AD-393C-4DF3-955D-2121D5F9E5E1}" type="datetimeFigureOut">
               <a:rPr lang="en-AU" smtClean="0"/>
-              <a:t>20/06/2025</a:t>
+              <a:t>27/06/2025</a:t>
             </a:fld>
             <a:endParaRPr lang="en-AU"/>
           </a:p>
@@ -2086,7 +2086,7 @@
           <a:p>
             <a:fld id="{107BE4AD-393C-4DF3-955D-2121D5F9E5E1}" type="datetimeFigureOut">
               <a:rPr lang="en-AU" smtClean="0"/>
-              <a:t>20/06/2025</a:t>
+              <a:t>27/06/2025</a:t>
             </a:fld>
             <a:endParaRPr lang="en-AU"/>
           </a:p>
@@ -2399,7 +2399,7 @@
           <a:p>
             <a:fld id="{107BE4AD-393C-4DF3-955D-2121D5F9E5E1}" type="datetimeFigureOut">
               <a:rPr lang="en-AU" smtClean="0"/>
-              <a:t>20/06/2025</a:t>
+              <a:t>27/06/2025</a:t>
             </a:fld>
             <a:endParaRPr lang="en-AU"/>
           </a:p>
@@ -2688,7 +2688,7 @@
           <a:p>
             <a:fld id="{107BE4AD-393C-4DF3-955D-2121D5F9E5E1}" type="datetimeFigureOut">
               <a:rPr lang="en-AU" smtClean="0"/>
-              <a:t>20/06/2025</a:t>
+              <a:t>27/06/2025</a:t>
             </a:fld>
             <a:endParaRPr lang="en-AU"/>
           </a:p>
@@ -2931,7 +2931,7 @@
           <a:p>
             <a:fld id="{107BE4AD-393C-4DF3-955D-2121D5F9E5E1}" type="datetimeFigureOut">
               <a:rPr lang="en-AU" smtClean="0"/>
-              <a:t>20/06/2025</a:t>
+              <a:t>27/06/2025</a:t>
             </a:fld>
             <a:endParaRPr lang="en-AU"/>
           </a:p>
@@ -3419,6 +3419,14 @@
 <file path=ppt/slides/slide2.xml><?xml version="1.0" encoding="utf-8"?>
 <p:sld xmlns:a="http://schemas.openxmlformats.org/drawingml/2006/main" xmlns:r="http://schemas.openxmlformats.org/officeDocument/2006/relationships" xmlns:p="http://schemas.openxmlformats.org/presentationml/2006/main">
   <p:cSld>
+    <p:bg>
+      <p:bgPr>
+        <a:solidFill>
+          <a:schemeClr val="tx1"/>
+        </a:solidFill>
+        <a:effectLst/>
+      </p:bgPr>
+    </p:bg>
     <p:spTree>
       <p:nvGrpSpPr>
         <p:cNvPr id="1" name=""/>
@@ -3433,6 +3441,114 @@
           <a:chExt cx="0" cy="0"/>
         </a:xfrm>
       </p:grpSpPr>
+      <p:pic>
+        <p:nvPicPr>
+          <p:cNvPr id="1028" name="Picture 4" descr="Inside Elevator Images – Browse 58,130 Stock Photos, Vectors ...">
+            <a:extLst>
+              <a:ext uri="{FF2B5EF4-FFF2-40B4-BE49-F238E27FC236}">
+                <a16:creationId xmlns:a16="http://schemas.microsoft.com/office/drawing/2014/main" id="{37ABE236-6C77-B7CE-8B71-DF82C5496D4E}"/>
+              </a:ext>
+            </a:extLst>
+          </p:cNvPr>
+          <p:cNvPicPr>
+            <a:picLocks noChangeAspect="1" noChangeArrowheads="1"/>
+          </p:cNvPicPr>
+          <p:nvPr/>
+        </p:nvPicPr>
+        <p:blipFill rotWithShape="1">
+          <a:blip r:embed="rId2">
+            <a:extLst>
+              <a:ext uri="{28A0092B-C50C-407E-A947-70E740481C1C}">
+                <a14:useLocalDpi xmlns:a14="http://schemas.microsoft.com/office/drawing/2010/main" val="0"/>
+              </a:ext>
+            </a:extLst>
+          </a:blip>
+          <a:srcRect t="7812" b="7812"/>
+          <a:stretch>
+            <a:fillRect/>
+          </a:stretch>
+        </p:blipFill>
+        <p:spPr bwMode="auto">
+          <a:xfrm>
+            <a:off x="0" y="0"/>
+            <a:ext cx="12192000" cy="6858000"/>
+          </a:xfrm>
+          <a:prstGeom prst="rect">
+            <a:avLst/>
+          </a:prstGeom>
+          <a:noFill/>
+          <a:extLst>
+            <a:ext uri="{909E8E84-426E-40DD-AFC4-6F175D3DCCD1}">
+              <a14:hiddenFill xmlns:a14="http://schemas.microsoft.com/office/drawing/2010/main">
+                <a:solidFill>
+                  <a:srgbClr val="FFFFFF"/>
+                </a:solidFill>
+              </a14:hiddenFill>
+            </a:ext>
+          </a:extLst>
+        </p:spPr>
+      </p:pic>
+      <p:sp>
+        <p:nvSpPr>
+          <p:cNvPr id="4" name="Rectangle 3">
+            <a:extLst>
+              <a:ext uri="{FF2B5EF4-FFF2-40B4-BE49-F238E27FC236}">
+                <a16:creationId xmlns:a16="http://schemas.microsoft.com/office/drawing/2014/main" id="{E39BCC01-C497-5511-B7B4-E58F0CEE2639}"/>
+              </a:ext>
+            </a:extLst>
+          </p:cNvPr>
+          <p:cNvSpPr/>
+          <p:nvPr/>
+        </p:nvSpPr>
+        <p:spPr>
+          <a:xfrm>
+            <a:off x="0" y="0"/>
+            <a:ext cx="12192000" cy="6858000"/>
+          </a:xfrm>
+          <a:prstGeom prst="rect">
+            <a:avLst/>
+          </a:prstGeom>
+          <a:solidFill>
+            <a:schemeClr val="tx1">
+              <a:lumMod val="95000"/>
+              <a:lumOff val="5000"/>
+              <a:alpha val="51000"/>
+            </a:schemeClr>
+          </a:solidFill>
+          <a:ln>
+            <a:solidFill>
+              <a:schemeClr val="tx1">
+                <a:lumMod val="95000"/>
+                <a:lumOff val="5000"/>
+              </a:schemeClr>
+            </a:solidFill>
+          </a:ln>
+        </p:spPr>
+        <p:style>
+          <a:lnRef idx="2">
+            <a:schemeClr val="accent1">
+              <a:shade val="15000"/>
+            </a:schemeClr>
+          </a:lnRef>
+          <a:fillRef idx="1">
+            <a:schemeClr val="accent1"/>
+          </a:fillRef>
+          <a:effectRef idx="0">
+            <a:schemeClr val="accent1"/>
+          </a:effectRef>
+          <a:fontRef idx="minor">
+            <a:schemeClr val="lt1"/>
+          </a:fontRef>
+        </p:style>
+        <p:txBody>
+          <a:bodyPr rtlCol="0" anchor="ctr"/>
+          <a:lstStyle/>
+          <a:p>
+            <a:pPr algn="ctr"/>
+            <a:endParaRPr lang="en-AU" dirty="0"/>
+          </a:p>
+        </p:txBody>
+      </p:sp>
       <p:sp>
         <p:nvSpPr>
           <p:cNvPr id="2" name="Title 1">
@@ -3449,37 +3565,92 @@
             <p:ph type="title"/>
           </p:nvPr>
         </p:nvSpPr>
-        <p:spPr/>
-        <p:txBody>
-          <a:bodyPr/>
-          <a:lstStyle/>
-          <a:p>
-            <a:endParaRPr lang="en-AU" dirty="0"/>
-          </a:p>
-        </p:txBody>
-      </p:sp>
-      <p:sp>
-        <p:nvSpPr>
-          <p:cNvPr id="3" name="Content Placeholder 2">
-            <a:extLst>
-              <a:ext uri="{FF2B5EF4-FFF2-40B4-BE49-F238E27FC236}">
-                <a16:creationId xmlns:a16="http://schemas.microsoft.com/office/drawing/2014/main" id="{F216C3F3-2F1A-91D8-783D-A0561F79868A}"/>
-              </a:ext>
-            </a:extLst>
-          </p:cNvPr>
-          <p:cNvSpPr>
-            <a:spLocks noGrp="1"/>
-          </p:cNvSpPr>
-          <p:nvPr>
-            <p:ph idx="1"/>
-          </p:nvPr>
-        </p:nvSpPr>
-        <p:spPr/>
-        <p:txBody>
-          <a:bodyPr/>
-          <a:lstStyle/>
-          <a:p>
-            <a:endParaRPr lang="en-AU" dirty="0"/>
+        <p:spPr>
+          <a:xfrm>
+            <a:off x="1803951" y="772893"/>
+            <a:ext cx="8584098" cy="1325563"/>
+          </a:xfrm>
+        </p:spPr>
+        <p:txBody>
+          <a:bodyPr>
+            <a:noAutofit/>
+          </a:bodyPr>
+          <a:lstStyle/>
+          <a:p>
+            <a:pPr algn="ctr"/>
+            <a:r>
+              <a:rPr lang="en-AU" sz="8800" b="1" u="sng" dirty="0">
+                <a:solidFill>
+                  <a:schemeClr val="bg1"/>
+                </a:solidFill>
+                <a:latin typeface="ADLaM Display" panose="02010000000000000000" pitchFamily="2" charset="0"/>
+                <a:ea typeface="ADLaM Display" panose="02010000000000000000" pitchFamily="2" charset="0"/>
+                <a:cs typeface="ADLaM Display" panose="02010000000000000000" pitchFamily="2" charset="0"/>
+              </a:rPr>
+              <a:t>Elevator Pitch</a:t>
+            </a:r>
+          </a:p>
+        </p:txBody>
+      </p:sp>
+      <p:sp>
+        <p:nvSpPr>
+          <p:cNvPr id="5" name="Title 1">
+            <a:extLst>
+              <a:ext uri="{FF2B5EF4-FFF2-40B4-BE49-F238E27FC236}">
+                <a16:creationId xmlns:a16="http://schemas.microsoft.com/office/drawing/2014/main" id="{4CA3D930-2EFD-CB1C-6428-7CE3D69C12D0}"/>
+              </a:ext>
+            </a:extLst>
+          </p:cNvPr>
+          <p:cNvSpPr txBox="1">
+            <a:spLocks/>
+          </p:cNvSpPr>
+          <p:nvPr/>
+        </p:nvSpPr>
+        <p:spPr>
+          <a:xfrm>
+            <a:off x="1484279" y="2871349"/>
+            <a:ext cx="9223442" cy="2769662"/>
+          </a:xfrm>
+          <a:prstGeom prst="rect">
+            <a:avLst/>
+          </a:prstGeom>
+        </p:spPr>
+        <p:txBody>
+          <a:bodyPr vert="horz" lIns="91440" tIns="45720" rIns="91440" bIns="45720" rtlCol="0" anchor="ctr">
+            <a:noAutofit/>
+          </a:bodyPr>
+          <a:lstStyle>
+            <a:lvl1pPr algn="l" defTabSz="914400" rtl="0" eaLnBrk="1" latinLnBrk="0" hangingPunct="1">
+              <a:lnSpc>
+                <a:spcPct val="90000"/>
+              </a:lnSpc>
+              <a:spcBef>
+                <a:spcPct val="0"/>
+              </a:spcBef>
+              <a:buNone/>
+              <a:defRPr sz="4400" kern="1200">
+                <a:solidFill>
+                  <a:schemeClr val="tx1"/>
+                </a:solidFill>
+                <a:latin typeface="+mj-lt"/>
+                <a:ea typeface="+mj-ea"/>
+                <a:cs typeface="+mj-cs"/>
+              </a:defRPr>
+            </a:lvl1pPr>
+          </a:lstStyle>
+          <a:p>
+            <a:pPr algn="ctr"/>
+            <a:r>
+              <a:rPr lang="en-AU" dirty="0">
+                <a:solidFill>
+                  <a:schemeClr val="bg1"/>
+                </a:solidFill>
+                <a:latin typeface="ADLaM Display" panose="02010000000000000000" pitchFamily="2" charset="0"/>
+                <a:ea typeface="ADLaM Display" panose="02010000000000000000" pitchFamily="2" charset="0"/>
+                <a:cs typeface="ADLaM Display" panose="02010000000000000000" pitchFamily="2" charset="0"/>
+              </a:rPr>
+              <a:t>Movement-based precision game with a focus on having control of a character in attempts to knock enemies off a tall tower. </a:t>
+            </a:r>
           </a:p>
         </p:txBody>
       </p:sp>

</xml_diff>